<commit_message>
Last revision before publishing
</commit_message>
<xml_diff>
--- a/assets/charts.pptx
+++ b/assets/charts.pptx
@@ -180,7 +180,7 @@
                   <a:bodyPr/>
                   <a:lstStyle/>
                   <a:p>
-                    <a:fld id="{865681CD-698A-934C-AE17-1A4F495CABA1}" type="CELLRANGE">
+                    <a:fld id="{C36BA64D-E227-E942-A621-E99D2F3AF762}" type="CELLRANGE">
                       <a:rPr lang="en-US"/>
                       <a:pPr/>
                       <a:t>[CELLRANGE]</a:t>
@@ -214,7 +214,7 @@
                   <a:bodyPr/>
                   <a:lstStyle/>
                   <a:p>
-                    <a:fld id="{0B659329-BBB5-B448-BD91-76DFA119EE68}" type="CELLRANGE">
+                    <a:fld id="{AF030CF2-338E-904E-8547-B28C0BEA1723}" type="CELLRANGE">
                       <a:rPr lang="en-US"/>
                       <a:pPr/>
                       <a:t>[CELLRANGE]</a:t>
@@ -248,7 +248,7 @@
                   <a:bodyPr/>
                   <a:lstStyle/>
                   <a:p>
-                    <a:fld id="{E0CFA8AD-AD1A-BE43-9A4C-393C87A4E66C}" type="CELLRANGE">
+                    <a:fld id="{5303FD1E-B762-FC41-A511-7C8009B0C93C}" type="CELLRANGE">
                       <a:rPr lang="en-US"/>
                       <a:pPr/>
                       <a:t>[CELLRANGE]</a:t>
@@ -424,7 +424,7 @@
                   <a:bodyPr/>
                   <a:lstStyle/>
                   <a:p>
-                    <a:fld id="{C614E5E5-B9D5-DF40-868E-39D836A8F168}" type="CELLRANGE">
+                    <a:fld id="{28C50450-ABDD-274E-A38F-64F1CF577A53}" type="CELLRANGE">
                       <a:rPr lang="en-US"/>
                       <a:pPr/>
                       <a:t>[CELLRANGE]</a:t>
@@ -458,7 +458,7 @@
                   <a:bodyPr/>
                   <a:lstStyle/>
                   <a:p>
-                    <a:fld id="{3033C3A5-420F-0448-A951-A7CCA361F735}" type="CELLRANGE">
+                    <a:fld id="{066AD41D-00D1-404B-B7CA-3585EBB4B5C8}" type="CELLRANGE">
                       <a:rPr lang="en-US"/>
                       <a:pPr/>
                       <a:t>[CELLRANGE]</a:t>
@@ -492,7 +492,7 @@
                   <a:bodyPr/>
                   <a:lstStyle/>
                   <a:p>
-                    <a:fld id="{820E771B-8B3E-5343-8CF9-EA6798C2EF79}" type="CELLRANGE">
+                    <a:fld id="{9C50F3E5-2C95-1A4E-9E46-1CE77BE1FBE1}" type="CELLRANGE">
                       <a:rPr lang="en-US"/>
                       <a:pPr/>
                       <a:t>[CELLRANGE]</a:t>
@@ -668,7 +668,7 @@
                   <a:bodyPr/>
                   <a:lstStyle/>
                   <a:p>
-                    <a:fld id="{21D79B47-D820-3246-A495-4D64A1F582AB}" type="CELLRANGE">
+                    <a:fld id="{D7F703AA-E0E4-704E-AB61-1CD793C71911}" type="CELLRANGE">
                       <a:rPr lang="en-US"/>
                       <a:pPr/>
                       <a:t>[CELLRANGE]</a:t>
@@ -702,7 +702,7 @@
                   <a:bodyPr/>
                   <a:lstStyle/>
                   <a:p>
-                    <a:fld id="{A3538442-62E2-924F-8F53-D7968978AB4A}" type="CELLRANGE">
+                    <a:fld id="{3B483C08-6D7D-1F42-AD30-FF7986823455}" type="CELLRANGE">
                       <a:rPr lang="en-US"/>
                       <a:pPr/>
                       <a:t>[CELLRANGE]</a:t>
@@ -736,7 +736,7 @@
                   <a:bodyPr/>
                   <a:lstStyle/>
                   <a:p>
-                    <a:fld id="{345083B8-B5E7-244E-84E4-0238367ECB25}" type="CELLRANGE">
+                    <a:fld id="{B7D6F5FA-7F20-9D42-A503-2957CF1BBCEB}" type="CELLRANGE">
                       <a:rPr lang="en-US"/>
                       <a:pPr/>
                       <a:t>[CELLRANGE]</a:t>
@@ -912,7 +912,7 @@
                   <a:bodyPr/>
                   <a:lstStyle/>
                   <a:p>
-                    <a:fld id="{D4F93BD4-FB3E-D048-9860-D84AD72F470B}" type="CELLRANGE">
+                    <a:fld id="{26B7A3F7-0408-ED4B-839C-BBE935CF59BB}" type="CELLRANGE">
                       <a:rPr lang="en-US"/>
                       <a:pPr/>
                       <a:t>[CELLRANGE]</a:t>
@@ -946,7 +946,7 @@
                   <a:bodyPr/>
                   <a:lstStyle/>
                   <a:p>
-                    <a:fld id="{67AF5D9C-7984-AE4E-9E21-2ECD641E05FE}" type="CELLRANGE">
+                    <a:fld id="{3DBA2161-ADAB-C547-83EC-5C8EE7743465}" type="CELLRANGE">
                       <a:rPr lang="en-US"/>
                       <a:pPr/>
                       <a:t>[CELLRANGE]</a:t>
@@ -980,7 +980,7 @@
                   <a:bodyPr/>
                   <a:lstStyle/>
                   <a:p>
-                    <a:fld id="{045343A7-5372-194A-B8A1-5792CD399724}" type="CELLRANGE">
+                    <a:fld id="{0041B89B-D812-C84E-8020-225FC80DE116}" type="CELLRANGE">
                       <a:rPr lang="en-US"/>
                       <a:pPr/>
                       <a:t>[CELLRANGE]</a:t>
@@ -1155,7 +1155,7 @@
                   <a:bodyPr/>
                   <a:lstStyle/>
                   <a:p>
-                    <a:fld id="{2D28AE78-C061-F44A-9A66-0521D4EAAC55}" type="CELLRANGE">
+                    <a:fld id="{CDDBBDE9-B7EF-AD4B-8039-50B6ED20B32B}" type="CELLRANGE">
                       <a:rPr lang="en-US"/>
                       <a:pPr/>
                       <a:t>[CELLRANGE]</a:t>
@@ -1189,7 +1189,7 @@
                   <a:bodyPr/>
                   <a:lstStyle/>
                   <a:p>
-                    <a:fld id="{88E31CD6-8E1E-6C40-941F-D7D591731A14}" type="CELLRANGE">
+                    <a:fld id="{1DE31868-7FBB-E444-9B29-DE84B0E22486}" type="CELLRANGE">
                       <a:rPr lang="en-US"/>
                       <a:pPr/>
                       <a:t>[CELLRANGE]</a:t>
@@ -1223,7 +1223,7 @@
                   <a:bodyPr/>
                   <a:lstStyle/>
                   <a:p>
-                    <a:fld id="{DEEAD0B0-1569-5B49-95E1-0C8F0F8802FA}" type="CELLRANGE">
+                    <a:fld id="{4688F475-CB96-2C45-A060-DCA3740A0258}" type="CELLRANGE">
                       <a:rPr lang="en-US"/>
                       <a:pPr/>
                       <a:t>[CELLRANGE]</a:t>
@@ -14712,7 +14712,7 @@
           <a:lstStyle/>
           <a:p>
             <a:pPr algn="ctr"/>
-            <a:endParaRPr lang="en-US"/>
+            <a:endParaRPr lang="en-US" dirty="0"/>
           </a:p>
         </p:txBody>
       </p:sp>

</xml_diff>